<commit_message>
add slide title and slide goodbye
</commit_message>
<xml_diff>
--- a/Docs/Template.pptx
+++ b/Docs/Template.pptx
@@ -5,7 +5,9 @@
     <p:sldMasterId id="2147483648" r:id="rId1"/>
   </p:sldMasterIdLst>
   <p:sldIdLst>
-    <p:sldId id="256" r:id="rId2"/>
+    <p:sldId id="257" r:id="rId2"/>
+    <p:sldId id="256" r:id="rId3"/>
+    <p:sldId id="258" r:id="rId4"/>
   </p:sldIdLst>
   <p:sldSz cx="12192000" cy="6858000"/>
   <p:notesSz cx="6858000" cy="9144000"/>
@@ -104,6 +106,11 @@
       </a:defRPr>
     </a:lvl9pPr>
   </p:defaultTextStyle>
+  <p:extLst>
+    <p:ext uri="{EFAFB233-063F-42B5-8137-9DF3F51BA10A}">
+      <p15:sldGuideLst xmlns:p15="http://schemas.microsoft.com/office/powerpoint/2012/main"/>
+    </p:ext>
+  </p:extLst>
 </p:presentation>
 </file>
 
@@ -3323,6 +3330,1183 @@
       </p:grpSpPr>
       <p:sp>
         <p:nvSpPr>
+          <p:cNvPr id="27" name="Rectangle: Rounded Corners 26">
+            <a:extLst>
+              <a:ext uri="{FF2B5EF4-FFF2-40B4-BE49-F238E27FC236}">
+                <a16:creationId xmlns:a16="http://schemas.microsoft.com/office/drawing/2014/main" id="{9ACAE1F0-C9D2-41CC-97D4-17C06648FDD4}"/>
+              </a:ext>
+            </a:extLst>
+          </p:cNvPr>
+          <p:cNvSpPr/>
+          <p:nvPr/>
+        </p:nvSpPr>
+        <p:spPr>
+          <a:xfrm>
+            <a:off x="3354229" y="1813904"/>
+            <a:ext cx="7930535" cy="2382684"/>
+          </a:xfrm>
+          <a:prstGeom prst="roundRect">
+            <a:avLst/>
+          </a:prstGeom>
+          <a:solidFill>
+            <a:srgbClr val="437E2E"/>
+          </a:solidFill>
+        </p:spPr>
+        <p:style>
+          <a:lnRef idx="2">
+            <a:schemeClr val="accent1">
+              <a:shade val="50000"/>
+            </a:schemeClr>
+          </a:lnRef>
+          <a:fillRef idx="1">
+            <a:schemeClr val="accent1"/>
+          </a:fillRef>
+          <a:effectRef idx="0">
+            <a:schemeClr val="accent1"/>
+          </a:effectRef>
+          <a:fontRef idx="minor">
+            <a:schemeClr val="lt1"/>
+          </a:fontRef>
+        </p:style>
+        <p:txBody>
+          <a:bodyPr rtlCol="0" anchor="ctr"/>
+          <a:lstStyle/>
+          <a:p>
+            <a:pPr algn="ctr"/>
+            <a:endParaRPr lang="en-US"/>
+          </a:p>
+        </p:txBody>
+      </p:sp>
+      <p:sp>
+        <p:nvSpPr>
+          <p:cNvPr id="2" name="Title 1">
+            <a:extLst>
+              <a:ext uri="{FF2B5EF4-FFF2-40B4-BE49-F238E27FC236}">
+                <a16:creationId xmlns:a16="http://schemas.microsoft.com/office/drawing/2014/main" id="{6E66EB7E-4FB3-459B-B96E-B80F3E936A98}"/>
+              </a:ext>
+            </a:extLst>
+          </p:cNvPr>
+          <p:cNvSpPr>
+            <a:spLocks noGrp="1"/>
+          </p:cNvSpPr>
+          <p:nvPr>
+            <p:ph type="ctrTitle"/>
+          </p:nvPr>
+        </p:nvSpPr>
+        <p:spPr>
+          <a:xfrm>
+            <a:off x="3557763" y="2040669"/>
+            <a:ext cx="7523465" cy="1952800"/>
+          </a:xfrm>
+        </p:spPr>
+        <p:txBody>
+          <a:bodyPr/>
+          <a:lstStyle/>
+          <a:p>
+            <a:endParaRPr lang="en-US">
+              <a:solidFill>
+                <a:schemeClr val="bg1"/>
+              </a:solidFill>
+            </a:endParaRPr>
+          </a:p>
+        </p:txBody>
+      </p:sp>
+      <p:sp>
+        <p:nvSpPr>
+          <p:cNvPr id="3" name="Subtitle 2">
+            <a:extLst>
+              <a:ext uri="{FF2B5EF4-FFF2-40B4-BE49-F238E27FC236}">
+                <a16:creationId xmlns:a16="http://schemas.microsoft.com/office/drawing/2014/main" id="{39458FBE-042F-4A80-A3A2-556A4B293747}"/>
+              </a:ext>
+            </a:extLst>
+          </p:cNvPr>
+          <p:cNvSpPr>
+            <a:spLocks noGrp="1"/>
+          </p:cNvSpPr>
+          <p:nvPr>
+            <p:ph type="subTitle" idx="1"/>
+          </p:nvPr>
+        </p:nvSpPr>
+        <p:spPr>
+          <a:xfrm>
+            <a:off x="7295068" y="4452098"/>
+            <a:ext cx="3989696" cy="1219067"/>
+          </a:xfrm>
+        </p:spPr>
+        <p:txBody>
+          <a:bodyPr>
+            <a:normAutofit/>
+          </a:bodyPr>
+          <a:lstStyle/>
+          <a:p>
+            <a:pPr algn="l"/>
+            <a:r>
+              <a:rPr lang="en-US" sz="1800">
+                <a:solidFill>
+                  <a:schemeClr val="accent1">
+                    <a:lumMod val="75000"/>
+                  </a:schemeClr>
+                </a:solidFill>
+              </a:rPr>
+              <a:t>Present: Nguyễn Văn A</a:t>
+            </a:r>
+          </a:p>
+          <a:p>
+            <a:pPr algn="l"/>
+            <a:r>
+              <a:rPr lang="en-US" sz="1800">
+                <a:solidFill>
+                  <a:schemeClr val="accent1">
+                    <a:lumMod val="75000"/>
+                  </a:schemeClr>
+                </a:solidFill>
+              </a:rPr>
+              <a:t>Demo: Nguyễn Văn B</a:t>
+            </a:r>
+          </a:p>
+          <a:p>
+            <a:pPr algn="l"/>
+            <a:r>
+              <a:rPr lang="en-US" sz="1800">
+                <a:solidFill>
+                  <a:schemeClr val="accent1">
+                    <a:lumMod val="75000"/>
+                  </a:schemeClr>
+                </a:solidFill>
+              </a:rPr>
+              <a:t>Collection: Nguyễn Văn C</a:t>
+            </a:r>
+          </a:p>
+        </p:txBody>
+      </p:sp>
+      <p:sp>
+        <p:nvSpPr>
+          <p:cNvPr id="12" name="Freeform: Shape 11">
+            <a:extLst>
+              <a:ext uri="{FF2B5EF4-FFF2-40B4-BE49-F238E27FC236}">
+                <a16:creationId xmlns:a16="http://schemas.microsoft.com/office/drawing/2014/main" id="{2DC185D3-DD97-4131-9AA4-365C1834CAA9}"/>
+              </a:ext>
+            </a:extLst>
+          </p:cNvPr>
+          <p:cNvSpPr/>
+          <p:nvPr/>
+        </p:nvSpPr>
+        <p:spPr>
+          <a:xfrm>
+            <a:off x="0" y="0"/>
+            <a:ext cx="2478157" cy="6858000"/>
+          </a:xfrm>
+          <a:custGeom>
+            <a:avLst/>
+            <a:gdLst>
+              <a:gd name="connsiteX0" fmla="*/ 2414919 w 2478157"/>
+              <a:gd name="connsiteY0" fmla="*/ 1182062 h 6858000"/>
+              <a:gd name="connsiteX1" fmla="*/ 363913 w 2478157"/>
+              <a:gd name="connsiteY1" fmla="*/ 3241518 h 6858000"/>
+              <a:gd name="connsiteX2" fmla="*/ 2305991 w 2478157"/>
+              <a:gd name="connsiteY2" fmla="*/ 5403995 h 6858000"/>
+              <a:gd name="connsiteX3" fmla="*/ 2311817 w 2478157"/>
+              <a:gd name="connsiteY3" fmla="*/ 5332662 h 6858000"/>
+              <a:gd name="connsiteX4" fmla="*/ 435459 w 2478157"/>
+              <a:gd name="connsiteY4" fmla="*/ 3243362 h 6858000"/>
+              <a:gd name="connsiteX5" fmla="*/ 2417058 w 2478157"/>
+              <a:gd name="connsiteY5" fmla="*/ 1253600 h 6858000"/>
+              <a:gd name="connsiteX6" fmla="*/ 0 w 2478157"/>
+              <a:gd name="connsiteY6" fmla="*/ 0 h 6858000"/>
+              <a:gd name="connsiteX7" fmla="*/ 2478157 w 2478157"/>
+              <a:gd name="connsiteY7" fmla="*/ 0 h 6858000"/>
+              <a:gd name="connsiteX8" fmla="*/ 2478157 w 2478157"/>
+              <a:gd name="connsiteY8" fmla="*/ 1413910 h 6858000"/>
+              <a:gd name="connsiteX9" fmla="*/ 636105 w 2478157"/>
+              <a:gd name="connsiteY9" fmla="*/ 3255962 h 6858000"/>
+              <a:gd name="connsiteX10" fmla="*/ 2478157 w 2478157"/>
+              <a:gd name="connsiteY10" fmla="*/ 5098014 h 6858000"/>
+              <a:gd name="connsiteX11" fmla="*/ 2478157 w 2478157"/>
+              <a:gd name="connsiteY11" fmla="*/ 6858000 h 6858000"/>
+              <a:gd name="connsiteX12" fmla="*/ 0 w 2478157"/>
+              <a:gd name="connsiteY12" fmla="*/ 6858000 h 6858000"/>
+            </a:gdLst>
+            <a:ahLst/>
+            <a:cxnLst>
+              <a:cxn ang="0">
+                <a:pos x="connsiteX0" y="connsiteY0"/>
+              </a:cxn>
+              <a:cxn ang="0">
+                <a:pos x="connsiteX1" y="connsiteY1"/>
+              </a:cxn>
+              <a:cxn ang="0">
+                <a:pos x="connsiteX2" y="connsiteY2"/>
+              </a:cxn>
+              <a:cxn ang="0">
+                <a:pos x="connsiteX3" y="connsiteY3"/>
+              </a:cxn>
+              <a:cxn ang="0">
+                <a:pos x="connsiteX4" y="connsiteY4"/>
+              </a:cxn>
+              <a:cxn ang="0">
+                <a:pos x="connsiteX5" y="connsiteY5"/>
+              </a:cxn>
+              <a:cxn ang="0">
+                <a:pos x="connsiteX6" y="connsiteY6"/>
+              </a:cxn>
+              <a:cxn ang="0">
+                <a:pos x="connsiteX7" y="connsiteY7"/>
+              </a:cxn>
+              <a:cxn ang="0">
+                <a:pos x="connsiteX8" y="connsiteY8"/>
+              </a:cxn>
+              <a:cxn ang="0">
+                <a:pos x="connsiteX9" y="connsiteY9"/>
+              </a:cxn>
+              <a:cxn ang="0">
+                <a:pos x="connsiteX10" y="connsiteY10"/>
+              </a:cxn>
+              <a:cxn ang="0">
+                <a:pos x="connsiteX11" y="connsiteY11"/>
+              </a:cxn>
+              <a:cxn ang="0">
+                <a:pos x="connsiteX12" y="connsiteY12"/>
+              </a:cxn>
+            </a:cxnLst>
+            <a:rect l="l" t="t" r="r" b="b"/>
+            <a:pathLst>
+              <a:path w="2478157" h="6858000">
+                <a:moveTo>
+                  <a:pt x="2414919" y="1182062"/>
+                </a:moveTo>
+                <a:cubicBezTo>
+                  <a:pt x="1293111" y="1215621"/>
+                  <a:pt x="392859" y="2119581"/>
+                  <a:pt x="363913" y="3241518"/>
+                </a:cubicBezTo>
+                <a:cubicBezTo>
+                  <a:pt x="334966" y="4363454"/>
+                  <a:pt x="1187406" y="5312634"/>
+                  <a:pt x="2305991" y="5403995"/>
+                </a:cubicBezTo>
+                <a:lnTo>
+                  <a:pt x="2311817" y="5332662"/>
+                </a:lnTo>
+                <a:cubicBezTo>
+                  <a:pt x="1231085" y="5244392"/>
+                  <a:pt x="407492" y="4327332"/>
+                  <a:pt x="435459" y="3243362"/>
+                </a:cubicBezTo>
+                <a:cubicBezTo>
+                  <a:pt x="463426" y="2159392"/>
+                  <a:pt x="1333212" y="1286023"/>
+                  <a:pt x="2417058" y="1253600"/>
+                </a:cubicBezTo>
+                <a:close/>
+                <a:moveTo>
+                  <a:pt x="0" y="0"/>
+                </a:moveTo>
+                <a:lnTo>
+                  <a:pt x="2478157" y="0"/>
+                </a:lnTo>
+                <a:lnTo>
+                  <a:pt x="2478157" y="1413910"/>
+                </a:lnTo>
+                <a:cubicBezTo>
+                  <a:pt x="1460820" y="1413910"/>
+                  <a:pt x="636105" y="2238625"/>
+                  <a:pt x="636105" y="3255962"/>
+                </a:cubicBezTo>
+                <a:cubicBezTo>
+                  <a:pt x="636105" y="4273299"/>
+                  <a:pt x="1460820" y="5098014"/>
+                  <a:pt x="2478157" y="5098014"/>
+                </a:cubicBezTo>
+                <a:lnTo>
+                  <a:pt x="2478157" y="6858000"/>
+                </a:lnTo>
+                <a:lnTo>
+                  <a:pt x="0" y="6858000"/>
+                </a:lnTo>
+                <a:close/>
+              </a:path>
+            </a:pathLst>
+          </a:custGeom>
+          <a:solidFill>
+            <a:srgbClr val="62BB43"/>
+          </a:solidFill>
+        </p:spPr>
+        <p:style>
+          <a:lnRef idx="2">
+            <a:schemeClr val="accent1">
+              <a:shade val="50000"/>
+            </a:schemeClr>
+          </a:lnRef>
+          <a:fillRef idx="1">
+            <a:schemeClr val="accent1"/>
+          </a:fillRef>
+          <a:effectRef idx="0">
+            <a:schemeClr val="accent1"/>
+          </a:effectRef>
+          <a:fontRef idx="minor">
+            <a:schemeClr val="lt1"/>
+          </a:fontRef>
+        </p:style>
+        <p:txBody>
+          <a:bodyPr wrap="square" rtlCol="0" anchor="ctr">
+            <a:noAutofit/>
+          </a:bodyPr>
+          <a:lstStyle/>
+          <a:p>
+            <a:pPr algn="ctr"/>
+            <a:endParaRPr lang="en-US"/>
+          </a:p>
+        </p:txBody>
+      </p:sp>
+      <p:pic>
+        <p:nvPicPr>
+          <p:cNvPr id="9" name="Picture 8">
+            <a:extLst>
+              <a:ext uri="{FF2B5EF4-FFF2-40B4-BE49-F238E27FC236}">
+                <a16:creationId xmlns:a16="http://schemas.microsoft.com/office/drawing/2014/main" id="{5046105B-FCAE-4B27-8CD3-C9AE3156BEE0}"/>
+              </a:ext>
+            </a:extLst>
+          </p:cNvPr>
+          <p:cNvPicPr>
+            <a:picLocks noChangeAspect="1"/>
+          </p:cNvPicPr>
+          <p:nvPr/>
+        </p:nvPicPr>
+        <p:blipFill>
+          <a:blip r:embed="rId2"/>
+          <a:stretch>
+            <a:fillRect/>
+          </a:stretch>
+        </p:blipFill>
+        <p:spPr>
+          <a:xfrm>
+            <a:off x="891654" y="2074916"/>
+            <a:ext cx="2220036" cy="1996314"/>
+          </a:xfrm>
+          <a:prstGeom prst="rect">
+            <a:avLst/>
+          </a:prstGeom>
+        </p:spPr>
+      </p:pic>
+      <p:sp>
+        <p:nvSpPr>
+          <p:cNvPr id="10" name="TextBox 9">
+            <a:extLst>
+              <a:ext uri="{FF2B5EF4-FFF2-40B4-BE49-F238E27FC236}">
+                <a16:creationId xmlns:a16="http://schemas.microsoft.com/office/drawing/2014/main" id="{E4C39C0C-FD15-4FC8-9B30-02B9573965F1}"/>
+              </a:ext>
+            </a:extLst>
+          </p:cNvPr>
+          <p:cNvSpPr txBox="1"/>
+          <p:nvPr/>
+        </p:nvSpPr>
+        <p:spPr>
+          <a:xfrm>
+            <a:off x="1101797" y="4023286"/>
+            <a:ext cx="1822187" cy="461665"/>
+          </a:xfrm>
+          <a:prstGeom prst="rect">
+            <a:avLst/>
+          </a:prstGeom>
+          <a:noFill/>
+        </p:spPr>
+        <p:txBody>
+          <a:bodyPr wrap="square" rtlCol="0">
+            <a:spAutoFit/>
+          </a:bodyPr>
+          <a:lstStyle/>
+          <a:p>
+            <a:pPr algn="ctr"/>
+            <a:r>
+              <a:rPr lang="en-US" sz="2400">
+                <a:ln w="0"/>
+                <a:solidFill>
+                  <a:schemeClr val="accent1"/>
+                </a:solidFill>
+                <a:effectLst>
+                  <a:outerShdw blurRad="38100" dist="25400" dir="5400000" algn="ctr" rotWithShape="0">
+                    <a:srgbClr val="6E747A">
+                      <a:alpha val="43000"/>
+                    </a:srgbClr>
+                  </a:outerShdw>
+                </a:effectLst>
+              </a:rPr>
+              <a:t>Spring Boot</a:t>
+            </a:r>
+          </a:p>
+        </p:txBody>
+      </p:sp>
+      <p:grpSp>
+        <p:nvGrpSpPr>
+          <p:cNvPr id="26" name="Group 25">
+            <a:extLst>
+              <a:ext uri="{FF2B5EF4-FFF2-40B4-BE49-F238E27FC236}">
+                <a16:creationId xmlns:a16="http://schemas.microsoft.com/office/drawing/2014/main" id="{C0AA48B8-B05B-4D93-8F10-B2F4EC39FED4}"/>
+              </a:ext>
+            </a:extLst>
+          </p:cNvPr>
+          <p:cNvGrpSpPr/>
+          <p:nvPr/>
+        </p:nvGrpSpPr>
+        <p:grpSpPr>
+          <a:xfrm>
+            <a:off x="11420105" y="10013"/>
+            <a:ext cx="864660" cy="6858000"/>
+            <a:chOff x="11418977" y="1579875"/>
+            <a:chExt cx="681387" cy="4661270"/>
+          </a:xfrm>
+        </p:grpSpPr>
+        <p:sp>
+          <p:nvSpPr>
+            <p:cNvPr id="13" name="Rectangle 12">
+              <a:extLst>
+                <a:ext uri="{FF2B5EF4-FFF2-40B4-BE49-F238E27FC236}">
+                  <a16:creationId xmlns:a16="http://schemas.microsoft.com/office/drawing/2014/main" id="{DCB2CE49-C4CC-421A-BACE-BB59401D7156}"/>
+                </a:ext>
+              </a:extLst>
+            </p:cNvPr>
+            <p:cNvSpPr/>
+            <p:nvPr/>
+          </p:nvSpPr>
+          <p:spPr>
+            <a:xfrm>
+              <a:off x="11604306" y="1579875"/>
+              <a:ext cx="391383" cy="4661270"/>
+            </a:xfrm>
+            <a:prstGeom prst="rect">
+              <a:avLst/>
+            </a:prstGeom>
+            <a:solidFill>
+              <a:schemeClr val="accent4">
+                <a:lumMod val="50000"/>
+              </a:schemeClr>
+            </a:solidFill>
+            <a:ln>
+              <a:solidFill>
+                <a:schemeClr val="accent5"/>
+              </a:solidFill>
+            </a:ln>
+          </p:spPr>
+          <p:style>
+            <a:lnRef idx="2">
+              <a:schemeClr val="accent1">
+                <a:shade val="50000"/>
+              </a:schemeClr>
+            </a:lnRef>
+            <a:fillRef idx="1">
+              <a:schemeClr val="accent1"/>
+            </a:fillRef>
+            <a:effectRef idx="0">
+              <a:schemeClr val="accent1"/>
+            </a:effectRef>
+            <a:fontRef idx="minor">
+              <a:schemeClr val="lt1"/>
+            </a:fontRef>
+          </p:style>
+          <p:txBody>
+            <a:bodyPr rtlCol="0" anchor="ctr"/>
+            <a:lstStyle/>
+            <a:p>
+              <a:pPr algn="ctr"/>
+              <a:endParaRPr lang="en-US"/>
+            </a:p>
+          </p:txBody>
+        </p:sp>
+        <p:sp>
+          <p:nvSpPr>
+            <p:cNvPr id="14" name="Oval 13">
+              <a:extLst>
+                <a:ext uri="{FF2B5EF4-FFF2-40B4-BE49-F238E27FC236}">
+                  <a16:creationId xmlns:a16="http://schemas.microsoft.com/office/drawing/2014/main" id="{FE26A2D4-C479-4A37-B431-E54BC32EF19B}"/>
+                </a:ext>
+              </a:extLst>
+            </p:cNvPr>
+            <p:cNvSpPr/>
+            <p:nvPr/>
+          </p:nvSpPr>
+          <p:spPr>
+            <a:xfrm rot="19906743" flipV="1">
+              <a:off x="11418977" y="1968062"/>
+              <a:ext cx="681387" cy="111006"/>
+            </a:xfrm>
+            <a:prstGeom prst="ellipse">
+              <a:avLst/>
+            </a:prstGeom>
+          </p:spPr>
+          <p:style>
+            <a:lnRef idx="2">
+              <a:schemeClr val="accent1">
+                <a:shade val="50000"/>
+              </a:schemeClr>
+            </a:lnRef>
+            <a:fillRef idx="1">
+              <a:schemeClr val="accent1"/>
+            </a:fillRef>
+            <a:effectRef idx="0">
+              <a:schemeClr val="accent1"/>
+            </a:effectRef>
+            <a:fontRef idx="minor">
+              <a:schemeClr val="lt1"/>
+            </a:fontRef>
+          </p:style>
+          <p:txBody>
+            <a:bodyPr rtlCol="0" anchor="ctr"/>
+            <a:lstStyle/>
+            <a:p>
+              <a:pPr algn="ctr"/>
+              <a:endParaRPr lang="en-US"/>
+            </a:p>
+          </p:txBody>
+        </p:sp>
+        <p:sp>
+          <p:nvSpPr>
+            <p:cNvPr id="15" name="Oval 14">
+              <a:extLst>
+                <a:ext uri="{FF2B5EF4-FFF2-40B4-BE49-F238E27FC236}">
+                  <a16:creationId xmlns:a16="http://schemas.microsoft.com/office/drawing/2014/main" id="{96E2DE78-A774-4053-B979-A6475BF85A84}"/>
+                </a:ext>
+              </a:extLst>
+            </p:cNvPr>
+            <p:cNvSpPr/>
+            <p:nvPr/>
+          </p:nvSpPr>
+          <p:spPr>
+            <a:xfrm rot="19906743" flipV="1">
+              <a:off x="11418977" y="2321137"/>
+              <a:ext cx="681387" cy="111006"/>
+            </a:xfrm>
+            <a:prstGeom prst="ellipse">
+              <a:avLst/>
+            </a:prstGeom>
+          </p:spPr>
+          <p:style>
+            <a:lnRef idx="2">
+              <a:schemeClr val="accent1">
+                <a:shade val="50000"/>
+              </a:schemeClr>
+            </a:lnRef>
+            <a:fillRef idx="1">
+              <a:schemeClr val="accent1"/>
+            </a:fillRef>
+            <a:effectRef idx="0">
+              <a:schemeClr val="accent1"/>
+            </a:effectRef>
+            <a:fontRef idx="minor">
+              <a:schemeClr val="lt1"/>
+            </a:fontRef>
+          </p:style>
+          <p:txBody>
+            <a:bodyPr rtlCol="0" anchor="ctr"/>
+            <a:lstStyle/>
+            <a:p>
+              <a:pPr algn="ctr"/>
+              <a:endParaRPr lang="en-US"/>
+            </a:p>
+          </p:txBody>
+        </p:sp>
+        <p:sp>
+          <p:nvSpPr>
+            <p:cNvPr id="16" name="Oval 15">
+              <a:extLst>
+                <a:ext uri="{FF2B5EF4-FFF2-40B4-BE49-F238E27FC236}">
+                  <a16:creationId xmlns:a16="http://schemas.microsoft.com/office/drawing/2014/main" id="{A3DF1379-DC92-4D06-B06B-7D1178C5BCC8}"/>
+                </a:ext>
+              </a:extLst>
+            </p:cNvPr>
+            <p:cNvSpPr/>
+            <p:nvPr/>
+          </p:nvSpPr>
+          <p:spPr>
+            <a:xfrm rot="19906743" flipV="1">
+              <a:off x="11418977" y="2674211"/>
+              <a:ext cx="681387" cy="111006"/>
+            </a:xfrm>
+            <a:prstGeom prst="ellipse">
+              <a:avLst/>
+            </a:prstGeom>
+          </p:spPr>
+          <p:style>
+            <a:lnRef idx="2">
+              <a:schemeClr val="accent1">
+                <a:shade val="50000"/>
+              </a:schemeClr>
+            </a:lnRef>
+            <a:fillRef idx="1">
+              <a:schemeClr val="accent1"/>
+            </a:fillRef>
+            <a:effectRef idx="0">
+              <a:schemeClr val="accent1"/>
+            </a:effectRef>
+            <a:fontRef idx="minor">
+              <a:schemeClr val="lt1"/>
+            </a:fontRef>
+          </p:style>
+          <p:txBody>
+            <a:bodyPr rtlCol="0" anchor="ctr"/>
+            <a:lstStyle/>
+            <a:p>
+              <a:pPr algn="ctr"/>
+              <a:endParaRPr lang="en-US"/>
+            </a:p>
+          </p:txBody>
+        </p:sp>
+        <p:sp>
+          <p:nvSpPr>
+            <p:cNvPr id="17" name="Oval 16">
+              <a:extLst>
+                <a:ext uri="{FF2B5EF4-FFF2-40B4-BE49-F238E27FC236}">
+                  <a16:creationId xmlns:a16="http://schemas.microsoft.com/office/drawing/2014/main" id="{EF2E6FB5-415B-4811-A272-E79C7649FC41}"/>
+                </a:ext>
+              </a:extLst>
+            </p:cNvPr>
+            <p:cNvSpPr/>
+            <p:nvPr/>
+          </p:nvSpPr>
+          <p:spPr>
+            <a:xfrm rot="19906743" flipV="1">
+              <a:off x="11418977" y="3027286"/>
+              <a:ext cx="681387" cy="111006"/>
+            </a:xfrm>
+            <a:prstGeom prst="ellipse">
+              <a:avLst/>
+            </a:prstGeom>
+          </p:spPr>
+          <p:style>
+            <a:lnRef idx="2">
+              <a:schemeClr val="accent1">
+                <a:shade val="50000"/>
+              </a:schemeClr>
+            </a:lnRef>
+            <a:fillRef idx="1">
+              <a:schemeClr val="accent1"/>
+            </a:fillRef>
+            <a:effectRef idx="0">
+              <a:schemeClr val="accent1"/>
+            </a:effectRef>
+            <a:fontRef idx="minor">
+              <a:schemeClr val="lt1"/>
+            </a:fontRef>
+          </p:style>
+          <p:txBody>
+            <a:bodyPr rtlCol="0" anchor="ctr"/>
+            <a:lstStyle/>
+            <a:p>
+              <a:pPr algn="ctr"/>
+              <a:endParaRPr lang="en-US"/>
+            </a:p>
+          </p:txBody>
+        </p:sp>
+        <p:sp>
+          <p:nvSpPr>
+            <p:cNvPr id="18" name="Oval 17">
+              <a:extLst>
+                <a:ext uri="{FF2B5EF4-FFF2-40B4-BE49-F238E27FC236}">
+                  <a16:creationId xmlns:a16="http://schemas.microsoft.com/office/drawing/2014/main" id="{9BF1D878-42D1-4A3B-B722-3EB2CB6E27BA}"/>
+                </a:ext>
+              </a:extLst>
+            </p:cNvPr>
+            <p:cNvSpPr/>
+            <p:nvPr/>
+          </p:nvSpPr>
+          <p:spPr>
+            <a:xfrm rot="19906743" flipV="1">
+              <a:off x="11418977" y="3380360"/>
+              <a:ext cx="681387" cy="111006"/>
+            </a:xfrm>
+            <a:prstGeom prst="ellipse">
+              <a:avLst/>
+            </a:prstGeom>
+          </p:spPr>
+          <p:style>
+            <a:lnRef idx="2">
+              <a:schemeClr val="accent1">
+                <a:shade val="50000"/>
+              </a:schemeClr>
+            </a:lnRef>
+            <a:fillRef idx="1">
+              <a:schemeClr val="accent1"/>
+            </a:fillRef>
+            <a:effectRef idx="0">
+              <a:schemeClr val="accent1"/>
+            </a:effectRef>
+            <a:fontRef idx="minor">
+              <a:schemeClr val="lt1"/>
+            </a:fontRef>
+          </p:style>
+          <p:txBody>
+            <a:bodyPr rtlCol="0" anchor="ctr"/>
+            <a:lstStyle/>
+            <a:p>
+              <a:pPr algn="ctr"/>
+              <a:endParaRPr lang="en-US"/>
+            </a:p>
+          </p:txBody>
+        </p:sp>
+        <p:sp>
+          <p:nvSpPr>
+            <p:cNvPr id="19" name="Oval 18">
+              <a:extLst>
+                <a:ext uri="{FF2B5EF4-FFF2-40B4-BE49-F238E27FC236}">
+                  <a16:creationId xmlns:a16="http://schemas.microsoft.com/office/drawing/2014/main" id="{B34E6821-D1E2-44D0-8D05-1A326399F4C6}"/>
+                </a:ext>
+              </a:extLst>
+            </p:cNvPr>
+            <p:cNvSpPr/>
+            <p:nvPr/>
+          </p:nvSpPr>
+          <p:spPr>
+            <a:xfrm rot="19906743" flipV="1">
+              <a:off x="11418977" y="3733435"/>
+              <a:ext cx="681387" cy="111006"/>
+            </a:xfrm>
+            <a:prstGeom prst="ellipse">
+              <a:avLst/>
+            </a:prstGeom>
+          </p:spPr>
+          <p:style>
+            <a:lnRef idx="2">
+              <a:schemeClr val="accent1">
+                <a:shade val="50000"/>
+              </a:schemeClr>
+            </a:lnRef>
+            <a:fillRef idx="1">
+              <a:schemeClr val="accent1"/>
+            </a:fillRef>
+            <a:effectRef idx="0">
+              <a:schemeClr val="accent1"/>
+            </a:effectRef>
+            <a:fontRef idx="minor">
+              <a:schemeClr val="lt1"/>
+            </a:fontRef>
+          </p:style>
+          <p:txBody>
+            <a:bodyPr rtlCol="0" anchor="ctr"/>
+            <a:lstStyle/>
+            <a:p>
+              <a:pPr algn="ctr"/>
+              <a:endParaRPr lang="en-US"/>
+            </a:p>
+          </p:txBody>
+        </p:sp>
+        <p:sp>
+          <p:nvSpPr>
+            <p:cNvPr id="20" name="Oval 19">
+              <a:extLst>
+                <a:ext uri="{FF2B5EF4-FFF2-40B4-BE49-F238E27FC236}">
+                  <a16:creationId xmlns:a16="http://schemas.microsoft.com/office/drawing/2014/main" id="{9D8BB4E8-A8AD-4D3F-B19B-0F30DD69CC35}"/>
+                </a:ext>
+              </a:extLst>
+            </p:cNvPr>
+            <p:cNvSpPr/>
+            <p:nvPr/>
+          </p:nvSpPr>
+          <p:spPr>
+            <a:xfrm rot="19906743" flipV="1">
+              <a:off x="11418977" y="4086509"/>
+              <a:ext cx="681387" cy="111006"/>
+            </a:xfrm>
+            <a:prstGeom prst="ellipse">
+              <a:avLst/>
+            </a:prstGeom>
+          </p:spPr>
+          <p:style>
+            <a:lnRef idx="2">
+              <a:schemeClr val="accent1">
+                <a:shade val="50000"/>
+              </a:schemeClr>
+            </a:lnRef>
+            <a:fillRef idx="1">
+              <a:schemeClr val="accent1"/>
+            </a:fillRef>
+            <a:effectRef idx="0">
+              <a:schemeClr val="accent1"/>
+            </a:effectRef>
+            <a:fontRef idx="minor">
+              <a:schemeClr val="lt1"/>
+            </a:fontRef>
+          </p:style>
+          <p:txBody>
+            <a:bodyPr rtlCol="0" anchor="ctr"/>
+            <a:lstStyle/>
+            <a:p>
+              <a:pPr algn="ctr"/>
+              <a:endParaRPr lang="en-US"/>
+            </a:p>
+          </p:txBody>
+        </p:sp>
+        <p:sp>
+          <p:nvSpPr>
+            <p:cNvPr id="21" name="Oval 20">
+              <a:extLst>
+                <a:ext uri="{FF2B5EF4-FFF2-40B4-BE49-F238E27FC236}">
+                  <a16:creationId xmlns:a16="http://schemas.microsoft.com/office/drawing/2014/main" id="{5522C316-C470-467E-AF93-0D1140C90CA1}"/>
+                </a:ext>
+              </a:extLst>
+            </p:cNvPr>
+            <p:cNvSpPr/>
+            <p:nvPr/>
+          </p:nvSpPr>
+          <p:spPr>
+            <a:xfrm rot="19906743" flipV="1">
+              <a:off x="11418977" y="4439584"/>
+              <a:ext cx="681387" cy="111006"/>
+            </a:xfrm>
+            <a:prstGeom prst="ellipse">
+              <a:avLst/>
+            </a:prstGeom>
+          </p:spPr>
+          <p:style>
+            <a:lnRef idx="2">
+              <a:schemeClr val="accent1">
+                <a:shade val="50000"/>
+              </a:schemeClr>
+            </a:lnRef>
+            <a:fillRef idx="1">
+              <a:schemeClr val="accent1"/>
+            </a:fillRef>
+            <a:effectRef idx="0">
+              <a:schemeClr val="accent1"/>
+            </a:effectRef>
+            <a:fontRef idx="minor">
+              <a:schemeClr val="lt1"/>
+            </a:fontRef>
+          </p:style>
+          <p:txBody>
+            <a:bodyPr rtlCol="0" anchor="ctr"/>
+            <a:lstStyle/>
+            <a:p>
+              <a:pPr algn="ctr"/>
+              <a:endParaRPr lang="en-US"/>
+            </a:p>
+          </p:txBody>
+        </p:sp>
+        <p:sp>
+          <p:nvSpPr>
+            <p:cNvPr id="22" name="Oval 21">
+              <a:extLst>
+                <a:ext uri="{FF2B5EF4-FFF2-40B4-BE49-F238E27FC236}">
+                  <a16:creationId xmlns:a16="http://schemas.microsoft.com/office/drawing/2014/main" id="{8F38B5FC-9761-42CA-AE85-236FC2632969}"/>
+                </a:ext>
+              </a:extLst>
+            </p:cNvPr>
+            <p:cNvSpPr/>
+            <p:nvPr/>
+          </p:nvSpPr>
+          <p:spPr>
+            <a:xfrm rot="19906743" flipV="1">
+              <a:off x="11418977" y="4792658"/>
+              <a:ext cx="681387" cy="111006"/>
+            </a:xfrm>
+            <a:prstGeom prst="ellipse">
+              <a:avLst/>
+            </a:prstGeom>
+          </p:spPr>
+          <p:style>
+            <a:lnRef idx="2">
+              <a:schemeClr val="accent1">
+                <a:shade val="50000"/>
+              </a:schemeClr>
+            </a:lnRef>
+            <a:fillRef idx="1">
+              <a:schemeClr val="accent1"/>
+            </a:fillRef>
+            <a:effectRef idx="0">
+              <a:schemeClr val="accent1"/>
+            </a:effectRef>
+            <a:fontRef idx="minor">
+              <a:schemeClr val="lt1"/>
+            </a:fontRef>
+          </p:style>
+          <p:txBody>
+            <a:bodyPr rtlCol="0" anchor="ctr"/>
+            <a:lstStyle/>
+            <a:p>
+              <a:pPr algn="ctr"/>
+              <a:endParaRPr lang="en-US"/>
+            </a:p>
+          </p:txBody>
+        </p:sp>
+        <p:sp>
+          <p:nvSpPr>
+            <p:cNvPr id="23" name="Oval 22">
+              <a:extLst>
+                <a:ext uri="{FF2B5EF4-FFF2-40B4-BE49-F238E27FC236}">
+                  <a16:creationId xmlns:a16="http://schemas.microsoft.com/office/drawing/2014/main" id="{7C5813BF-DBFF-4B1F-A88A-D05CEE50C831}"/>
+                </a:ext>
+              </a:extLst>
+            </p:cNvPr>
+            <p:cNvSpPr/>
+            <p:nvPr/>
+          </p:nvSpPr>
+          <p:spPr>
+            <a:xfrm rot="19906743" flipV="1">
+              <a:off x="11418977" y="5145733"/>
+              <a:ext cx="681387" cy="111006"/>
+            </a:xfrm>
+            <a:prstGeom prst="ellipse">
+              <a:avLst/>
+            </a:prstGeom>
+          </p:spPr>
+          <p:style>
+            <a:lnRef idx="2">
+              <a:schemeClr val="accent1">
+                <a:shade val="50000"/>
+              </a:schemeClr>
+            </a:lnRef>
+            <a:fillRef idx="1">
+              <a:schemeClr val="accent1"/>
+            </a:fillRef>
+            <a:effectRef idx="0">
+              <a:schemeClr val="accent1"/>
+            </a:effectRef>
+            <a:fontRef idx="minor">
+              <a:schemeClr val="lt1"/>
+            </a:fontRef>
+          </p:style>
+          <p:txBody>
+            <a:bodyPr rtlCol="0" anchor="ctr"/>
+            <a:lstStyle/>
+            <a:p>
+              <a:pPr algn="ctr"/>
+              <a:endParaRPr lang="en-US"/>
+            </a:p>
+          </p:txBody>
+        </p:sp>
+        <p:sp>
+          <p:nvSpPr>
+            <p:cNvPr id="24" name="Oval 23">
+              <a:extLst>
+                <a:ext uri="{FF2B5EF4-FFF2-40B4-BE49-F238E27FC236}">
+                  <a16:creationId xmlns:a16="http://schemas.microsoft.com/office/drawing/2014/main" id="{F2D92BD1-1D61-4BA2-B617-E0453B778E20}"/>
+                </a:ext>
+              </a:extLst>
+            </p:cNvPr>
+            <p:cNvSpPr/>
+            <p:nvPr/>
+          </p:nvSpPr>
+          <p:spPr>
+            <a:xfrm rot="19906743" flipV="1">
+              <a:off x="11418977" y="5498807"/>
+              <a:ext cx="681387" cy="111006"/>
+            </a:xfrm>
+            <a:prstGeom prst="ellipse">
+              <a:avLst/>
+            </a:prstGeom>
+          </p:spPr>
+          <p:style>
+            <a:lnRef idx="2">
+              <a:schemeClr val="accent1">
+                <a:shade val="50000"/>
+              </a:schemeClr>
+            </a:lnRef>
+            <a:fillRef idx="1">
+              <a:schemeClr val="accent1"/>
+            </a:fillRef>
+            <a:effectRef idx="0">
+              <a:schemeClr val="accent1"/>
+            </a:effectRef>
+            <a:fontRef idx="minor">
+              <a:schemeClr val="lt1"/>
+            </a:fontRef>
+          </p:style>
+          <p:txBody>
+            <a:bodyPr rtlCol="0" anchor="ctr"/>
+            <a:lstStyle/>
+            <a:p>
+              <a:pPr algn="ctr"/>
+              <a:endParaRPr lang="en-US"/>
+            </a:p>
+          </p:txBody>
+        </p:sp>
+        <p:sp>
+          <p:nvSpPr>
+            <p:cNvPr id="25" name="Oval 24">
+              <a:extLst>
+                <a:ext uri="{FF2B5EF4-FFF2-40B4-BE49-F238E27FC236}">
+                  <a16:creationId xmlns:a16="http://schemas.microsoft.com/office/drawing/2014/main" id="{D071AE62-2D85-446E-902D-B149C5FECF5B}"/>
+                </a:ext>
+              </a:extLst>
+            </p:cNvPr>
+            <p:cNvSpPr/>
+            <p:nvPr/>
+          </p:nvSpPr>
+          <p:spPr>
+            <a:xfrm rot="19906743" flipV="1">
+              <a:off x="11418977" y="5851882"/>
+              <a:ext cx="681387" cy="111006"/>
+            </a:xfrm>
+            <a:prstGeom prst="ellipse">
+              <a:avLst/>
+            </a:prstGeom>
+          </p:spPr>
+          <p:style>
+            <a:lnRef idx="2">
+              <a:schemeClr val="accent1">
+                <a:shade val="50000"/>
+              </a:schemeClr>
+            </a:lnRef>
+            <a:fillRef idx="1">
+              <a:schemeClr val="accent1"/>
+            </a:fillRef>
+            <a:effectRef idx="0">
+              <a:schemeClr val="accent1"/>
+            </a:effectRef>
+            <a:fontRef idx="minor">
+              <a:schemeClr val="lt1"/>
+            </a:fontRef>
+          </p:style>
+          <p:txBody>
+            <a:bodyPr rtlCol="0" anchor="ctr"/>
+            <a:lstStyle/>
+            <a:p>
+              <a:pPr algn="ctr"/>
+              <a:endParaRPr lang="en-US"/>
+            </a:p>
+          </p:txBody>
+        </p:sp>
+      </p:grpSp>
+      <p:sp>
+        <p:nvSpPr>
+          <p:cNvPr id="34" name="Diagonal Stripe 33">
+            <a:extLst>
+              <a:ext uri="{FF2B5EF4-FFF2-40B4-BE49-F238E27FC236}">
+                <a16:creationId xmlns:a16="http://schemas.microsoft.com/office/drawing/2014/main" id="{DBC811D1-03C8-4F51-A0B5-174F7F2B4A8C}"/>
+              </a:ext>
+            </a:extLst>
+          </p:cNvPr>
+          <p:cNvSpPr/>
+          <p:nvPr/>
+        </p:nvSpPr>
+        <p:spPr>
+          <a:xfrm rot="3043583">
+            <a:off x="4219405" y="3400131"/>
+            <a:ext cx="5650450" cy="6888587"/>
+          </a:xfrm>
+          <a:prstGeom prst="diagStripe">
+            <a:avLst>
+              <a:gd name="adj" fmla="val 96760"/>
+            </a:avLst>
+          </a:prstGeom>
+          <a:solidFill>
+            <a:srgbClr val="9CD488"/>
+          </a:solidFill>
+        </p:spPr>
+        <p:style>
+          <a:lnRef idx="2">
+            <a:schemeClr val="accent1">
+              <a:shade val="50000"/>
+            </a:schemeClr>
+          </a:lnRef>
+          <a:fillRef idx="1">
+            <a:schemeClr val="accent1"/>
+          </a:fillRef>
+          <a:effectRef idx="0">
+            <a:schemeClr val="accent1"/>
+          </a:effectRef>
+          <a:fontRef idx="minor">
+            <a:schemeClr val="lt1"/>
+          </a:fontRef>
+        </p:style>
+        <p:txBody>
+          <a:bodyPr rtlCol="0" anchor="ctr"/>
+          <a:lstStyle/>
+          <a:p>
+            <a:pPr algn="ctr"/>
+            <a:endParaRPr lang="en-US">
+              <a:solidFill>
+                <a:schemeClr val="tx1"/>
+              </a:solidFill>
+            </a:endParaRPr>
+          </a:p>
+        </p:txBody>
+      </p:sp>
+      <p:sp>
+        <p:nvSpPr>
+          <p:cNvPr id="38" name="Diagonal Stripe 37">
+            <a:extLst>
+              <a:ext uri="{FF2B5EF4-FFF2-40B4-BE49-F238E27FC236}">
+                <a16:creationId xmlns:a16="http://schemas.microsoft.com/office/drawing/2014/main" id="{2D50C728-F09F-4825-AF05-5101E40A5B36}"/>
+              </a:ext>
+            </a:extLst>
+          </p:cNvPr>
+          <p:cNvSpPr/>
+          <p:nvPr/>
+        </p:nvSpPr>
+        <p:spPr>
+          <a:xfrm rot="18561219" flipV="1">
+            <a:off x="4263276" y="-3434281"/>
+            <a:ext cx="5650450" cy="6888587"/>
+          </a:xfrm>
+          <a:prstGeom prst="diagStripe">
+            <a:avLst>
+              <a:gd name="adj" fmla="val 97163"/>
+            </a:avLst>
+          </a:prstGeom>
+          <a:solidFill>
+            <a:srgbClr val="9CD488"/>
+          </a:solidFill>
+        </p:spPr>
+        <p:style>
+          <a:lnRef idx="2">
+            <a:schemeClr val="accent1">
+              <a:shade val="50000"/>
+            </a:schemeClr>
+          </a:lnRef>
+          <a:fillRef idx="1">
+            <a:schemeClr val="accent1"/>
+          </a:fillRef>
+          <a:effectRef idx="0">
+            <a:schemeClr val="accent1"/>
+          </a:effectRef>
+          <a:fontRef idx="minor">
+            <a:schemeClr val="lt1"/>
+          </a:fontRef>
+        </p:style>
+        <p:txBody>
+          <a:bodyPr rtlCol="0" anchor="ctr"/>
+          <a:lstStyle/>
+          <a:p>
+            <a:pPr algn="ctr"/>
+            <a:endParaRPr lang="en-US">
+              <a:solidFill>
+                <a:schemeClr val="tx1"/>
+              </a:solidFill>
+            </a:endParaRPr>
+          </a:p>
+        </p:txBody>
+      </p:sp>
+    </p:spTree>
+    <p:extLst>
+      <p:ext uri="{BB962C8B-B14F-4D97-AF65-F5344CB8AC3E}">
+        <p14:creationId xmlns:p14="http://schemas.microsoft.com/office/powerpoint/2010/main" val="221862093"/>
+      </p:ext>
+    </p:extLst>
+  </p:cSld>
+  <p:clrMapOvr>
+    <a:masterClrMapping/>
+  </p:clrMapOvr>
+</p:sld>
+</file>
+
+<file path=ppt/slides/slide2.xml><?xml version="1.0" encoding="utf-8"?>
+<p:sld xmlns:a="http://schemas.openxmlformats.org/drawingml/2006/main" xmlns:r="http://schemas.openxmlformats.org/officeDocument/2006/relationships" xmlns:p="http://schemas.openxmlformats.org/presentationml/2006/main">
+  <p:cSld>
+    <p:spTree>
+      <p:nvGrpSpPr>
+        <p:cNvPr id="1" name=""/>
+        <p:cNvGrpSpPr/>
+        <p:nvPr/>
+      </p:nvGrpSpPr>
+      <p:grpSpPr>
+        <a:xfrm>
+          <a:off x="0" y="0"/>
+          <a:ext cx="0" cy="0"/>
+          <a:chOff x="0" y="0"/>
+          <a:chExt cx="0" cy="0"/>
+        </a:xfrm>
+      </p:grpSpPr>
+      <p:sp>
+        <p:nvSpPr>
           <p:cNvPr id="7" name="Rectangle 6">
             <a:extLst>
               <a:ext uri="{FF2B5EF4-FFF2-40B4-BE49-F238E27FC236}">
@@ -4206,7 +5390,7 @@
         </p:nvGrpSpPr>
         <p:grpSpPr>
           <a:xfrm>
-            <a:off x="10972802" y="259008"/>
+            <a:off x="10905695" y="261391"/>
             <a:ext cx="1393371" cy="1017426"/>
             <a:chOff x="6705600" y="3312228"/>
             <a:chExt cx="1393371" cy="1017426"/>
@@ -4861,7 +6045,7 @@
             <a:pPr algn="ctr"/>
             <a:fld id="{363F9A15-E631-4AF5-BEA1-974BCB067A5D}" type="slidenum">
               <a:rPr lang="en-US"/>
-              <a:t>1</a:t>
+              <a:t>2</a:t>
             </a:fld>
             <a:endParaRPr lang="en-US"/>
           </a:p>
@@ -4871,6 +6055,1316 @@
     <p:extLst>
       <p:ext uri="{BB962C8B-B14F-4D97-AF65-F5344CB8AC3E}">
         <p14:creationId xmlns:p14="http://schemas.microsoft.com/office/powerpoint/2010/main" val="3689183072"/>
+      </p:ext>
+    </p:extLst>
+  </p:cSld>
+  <p:clrMapOvr>
+    <a:masterClrMapping/>
+  </p:clrMapOvr>
+  <p:timing>
+    <p:tnLst>
+      <p:par>
+        <p:cTn id="1" dur="indefinite" restart="never" nodeType="tmRoot">
+          <p:childTnLst>
+            <p:seq concurrent="1" nextAc="seek">
+              <p:cTn id="2" dur="indefinite" nodeType="mainSeq">
+                <p:childTnLst>
+                  <p:par>
+                    <p:cTn id="3" fill="hold">
+                      <p:stCondLst>
+                        <p:cond delay="indefinite"/>
+                      </p:stCondLst>
+                      <p:childTnLst>
+                        <p:par>
+                          <p:cTn id="4" fill="hold">
+                            <p:stCondLst>
+                              <p:cond delay="0"/>
+                            </p:stCondLst>
+                            <p:childTnLst>
+                              <p:par>
+                                <p:cTn id="5" presetID="2" presetClass="entr" presetSubtype="2" fill="hold" nodeType="clickEffect">
+                                  <p:stCondLst>
+                                    <p:cond delay="0"/>
+                                  </p:stCondLst>
+                                  <p:childTnLst>
+                                    <p:set>
+                                      <p:cBhvr>
+                                        <p:cTn id="6" dur="1" fill="hold">
+                                          <p:stCondLst>
+                                            <p:cond delay="0"/>
+                                          </p:stCondLst>
+                                        </p:cTn>
+                                        <p:tgtEl>
+                                          <p:spTgt spid="16"/>
+                                        </p:tgtEl>
+                                        <p:attrNameLst>
+                                          <p:attrName>style.visibility</p:attrName>
+                                        </p:attrNameLst>
+                                      </p:cBhvr>
+                                      <p:to>
+                                        <p:strVal val="visible"/>
+                                      </p:to>
+                                    </p:set>
+                                    <p:anim calcmode="lin" valueType="num">
+                                      <p:cBhvr additive="base">
+                                        <p:cTn id="7" dur="200" fill="hold"/>
+                                        <p:tgtEl>
+                                          <p:spTgt spid="16"/>
+                                        </p:tgtEl>
+                                        <p:attrNameLst>
+                                          <p:attrName>ppt_x</p:attrName>
+                                        </p:attrNameLst>
+                                      </p:cBhvr>
+                                      <p:tavLst>
+                                        <p:tav tm="0">
+                                          <p:val>
+                                            <p:strVal val="1+#ppt_w/2"/>
+                                          </p:val>
+                                        </p:tav>
+                                        <p:tav tm="100000">
+                                          <p:val>
+                                            <p:strVal val="#ppt_x"/>
+                                          </p:val>
+                                        </p:tav>
+                                      </p:tavLst>
+                                    </p:anim>
+                                    <p:anim calcmode="lin" valueType="num">
+                                      <p:cBhvr additive="base">
+                                        <p:cTn id="8" dur="200" fill="hold"/>
+                                        <p:tgtEl>
+                                          <p:spTgt spid="16"/>
+                                        </p:tgtEl>
+                                        <p:attrNameLst>
+                                          <p:attrName>ppt_y</p:attrName>
+                                        </p:attrNameLst>
+                                      </p:cBhvr>
+                                      <p:tavLst>
+                                        <p:tav tm="0">
+                                          <p:val>
+                                            <p:strVal val="#ppt_y"/>
+                                          </p:val>
+                                        </p:tav>
+                                        <p:tav tm="100000">
+                                          <p:val>
+                                            <p:strVal val="#ppt_y"/>
+                                          </p:val>
+                                        </p:tav>
+                                      </p:tavLst>
+                                    </p:anim>
+                                  </p:childTnLst>
+                                </p:cTn>
+                              </p:par>
+                              <p:par>
+                                <p:cTn id="9" presetID="2" presetClass="entr" presetSubtype="2" fill="hold" grpId="0" nodeType="withEffect" nodePh="1">
+                                  <p:stCondLst>
+                                    <p:cond delay="0"/>
+                                  </p:stCondLst>
+                                  <p:endCondLst>
+                                    <p:cond evt="begin" delay="0">
+                                      <p:tn val="9"/>
+                                    </p:cond>
+                                  </p:endCondLst>
+                                  <p:childTnLst>
+                                    <p:set>
+                                      <p:cBhvr>
+                                        <p:cTn id="10" dur="1" fill="hold">
+                                          <p:stCondLst>
+                                            <p:cond delay="0"/>
+                                          </p:stCondLst>
+                                        </p:cTn>
+                                        <p:tgtEl>
+                                          <p:spTgt spid="68"/>
+                                        </p:tgtEl>
+                                        <p:attrNameLst>
+                                          <p:attrName>style.visibility</p:attrName>
+                                        </p:attrNameLst>
+                                      </p:cBhvr>
+                                      <p:to>
+                                        <p:strVal val="visible"/>
+                                      </p:to>
+                                    </p:set>
+                                    <p:anim calcmode="lin" valueType="num">
+                                      <p:cBhvr additive="base">
+                                        <p:cTn id="11" dur="200" fill="hold"/>
+                                        <p:tgtEl>
+                                          <p:spTgt spid="68"/>
+                                        </p:tgtEl>
+                                        <p:attrNameLst>
+                                          <p:attrName>ppt_x</p:attrName>
+                                        </p:attrNameLst>
+                                      </p:cBhvr>
+                                      <p:tavLst>
+                                        <p:tav tm="0">
+                                          <p:val>
+                                            <p:strVal val="1+#ppt_w/2"/>
+                                          </p:val>
+                                        </p:tav>
+                                        <p:tav tm="100000">
+                                          <p:val>
+                                            <p:strVal val="#ppt_x"/>
+                                          </p:val>
+                                        </p:tav>
+                                      </p:tavLst>
+                                    </p:anim>
+                                    <p:anim calcmode="lin" valueType="num">
+                                      <p:cBhvr additive="base">
+                                        <p:cTn id="12" dur="200" fill="hold"/>
+                                        <p:tgtEl>
+                                          <p:spTgt spid="68"/>
+                                        </p:tgtEl>
+                                        <p:attrNameLst>
+                                          <p:attrName>ppt_y</p:attrName>
+                                        </p:attrNameLst>
+                                      </p:cBhvr>
+                                      <p:tavLst>
+                                        <p:tav tm="0">
+                                          <p:val>
+                                            <p:strVal val="#ppt_y"/>
+                                          </p:val>
+                                        </p:tav>
+                                        <p:tav tm="100000">
+                                          <p:val>
+                                            <p:strVal val="#ppt_y"/>
+                                          </p:val>
+                                        </p:tav>
+                                      </p:tavLst>
+                                    </p:anim>
+                                  </p:childTnLst>
+                                </p:cTn>
+                              </p:par>
+                            </p:childTnLst>
+                          </p:cTn>
+                        </p:par>
+                      </p:childTnLst>
+                    </p:cTn>
+                  </p:par>
+                </p:childTnLst>
+              </p:cTn>
+              <p:prevCondLst>
+                <p:cond evt="onPrev" delay="0">
+                  <p:tgtEl>
+                    <p:sldTgt/>
+                  </p:tgtEl>
+                </p:cond>
+              </p:prevCondLst>
+              <p:nextCondLst>
+                <p:cond evt="onNext" delay="0">
+                  <p:tgtEl>
+                    <p:sldTgt/>
+                  </p:tgtEl>
+                </p:cond>
+              </p:nextCondLst>
+            </p:seq>
+          </p:childTnLst>
+        </p:cTn>
+      </p:par>
+    </p:tnLst>
+    <p:bldLst>
+      <p:bldP spid="68" grpId="0"/>
+    </p:bldLst>
+  </p:timing>
+</p:sld>
+</file>
+
+<file path=ppt/slides/slide3.xml><?xml version="1.0" encoding="utf-8"?>
+<p:sld xmlns:a="http://schemas.openxmlformats.org/drawingml/2006/main" xmlns:r="http://schemas.openxmlformats.org/officeDocument/2006/relationships" xmlns:p="http://schemas.openxmlformats.org/presentationml/2006/main">
+  <p:cSld>
+    <p:spTree>
+      <p:nvGrpSpPr>
+        <p:cNvPr id="1" name=""/>
+        <p:cNvGrpSpPr/>
+        <p:nvPr/>
+      </p:nvGrpSpPr>
+      <p:grpSpPr>
+        <a:xfrm>
+          <a:off x="0" y="0"/>
+          <a:ext cx="0" cy="0"/>
+          <a:chOff x="0" y="0"/>
+          <a:chExt cx="0" cy="0"/>
+        </a:xfrm>
+      </p:grpSpPr>
+      <p:sp>
+        <p:nvSpPr>
+          <p:cNvPr id="27" name="Rectangle: Rounded Corners 26">
+            <a:extLst>
+              <a:ext uri="{FF2B5EF4-FFF2-40B4-BE49-F238E27FC236}">
+                <a16:creationId xmlns:a16="http://schemas.microsoft.com/office/drawing/2014/main" id="{9ACAE1F0-C9D2-41CC-97D4-17C06648FDD4}"/>
+              </a:ext>
+            </a:extLst>
+          </p:cNvPr>
+          <p:cNvSpPr/>
+          <p:nvPr/>
+        </p:nvSpPr>
+        <p:spPr>
+          <a:xfrm>
+            <a:off x="3314639" y="2600767"/>
+            <a:ext cx="7930535" cy="2382684"/>
+          </a:xfrm>
+          <a:prstGeom prst="roundRect">
+            <a:avLst/>
+          </a:prstGeom>
+        </p:spPr>
+        <p:style>
+          <a:lnRef idx="2">
+            <a:schemeClr val="accent1">
+              <a:shade val="50000"/>
+            </a:schemeClr>
+          </a:lnRef>
+          <a:fillRef idx="1">
+            <a:schemeClr val="accent1"/>
+          </a:fillRef>
+          <a:effectRef idx="0">
+            <a:schemeClr val="accent1"/>
+          </a:effectRef>
+          <a:fontRef idx="minor">
+            <a:schemeClr val="lt1"/>
+          </a:fontRef>
+        </p:style>
+        <p:txBody>
+          <a:bodyPr rtlCol="0" anchor="ctr"/>
+          <a:lstStyle/>
+          <a:p>
+            <a:pPr algn="ctr"/>
+            <a:endParaRPr lang="en-US"/>
+          </a:p>
+        </p:txBody>
+      </p:sp>
+      <p:sp>
+        <p:nvSpPr>
+          <p:cNvPr id="2" name="Title 1">
+            <a:extLst>
+              <a:ext uri="{FF2B5EF4-FFF2-40B4-BE49-F238E27FC236}">
+                <a16:creationId xmlns:a16="http://schemas.microsoft.com/office/drawing/2014/main" id="{6E66EB7E-4FB3-459B-B96E-B80F3E936A98}"/>
+              </a:ext>
+            </a:extLst>
+          </p:cNvPr>
+          <p:cNvSpPr>
+            <a:spLocks noGrp="1"/>
+          </p:cNvSpPr>
+          <p:nvPr>
+            <p:ph type="ctrTitle"/>
+          </p:nvPr>
+        </p:nvSpPr>
+        <p:spPr>
+          <a:xfrm>
+            <a:off x="3518173" y="2691052"/>
+            <a:ext cx="7523465" cy="1952800"/>
+          </a:xfrm>
+        </p:spPr>
+        <p:txBody>
+          <a:bodyPr>
+            <a:normAutofit/>
+          </a:bodyPr>
+          <a:lstStyle/>
+          <a:p>
+            <a:r>
+              <a:rPr lang="en-US" sz="7200" b="1">
+                <a:solidFill>
+                  <a:schemeClr val="bg1"/>
+                </a:solidFill>
+              </a:rPr>
+              <a:t>THANK YOU</a:t>
+            </a:r>
+          </a:p>
+        </p:txBody>
+      </p:sp>
+      <p:sp>
+        <p:nvSpPr>
+          <p:cNvPr id="12" name="Freeform: Shape 11">
+            <a:extLst>
+              <a:ext uri="{FF2B5EF4-FFF2-40B4-BE49-F238E27FC236}">
+                <a16:creationId xmlns:a16="http://schemas.microsoft.com/office/drawing/2014/main" id="{2DC185D3-DD97-4131-9AA4-365C1834CAA9}"/>
+              </a:ext>
+            </a:extLst>
+          </p:cNvPr>
+          <p:cNvSpPr/>
+          <p:nvPr/>
+        </p:nvSpPr>
+        <p:spPr>
+          <a:xfrm>
+            <a:off x="0" y="0"/>
+            <a:ext cx="2478157" cy="6858000"/>
+          </a:xfrm>
+          <a:custGeom>
+            <a:avLst/>
+            <a:gdLst>
+              <a:gd name="connsiteX0" fmla="*/ 2414919 w 2478157"/>
+              <a:gd name="connsiteY0" fmla="*/ 1182062 h 6858000"/>
+              <a:gd name="connsiteX1" fmla="*/ 363913 w 2478157"/>
+              <a:gd name="connsiteY1" fmla="*/ 3241518 h 6858000"/>
+              <a:gd name="connsiteX2" fmla="*/ 2305991 w 2478157"/>
+              <a:gd name="connsiteY2" fmla="*/ 5403995 h 6858000"/>
+              <a:gd name="connsiteX3" fmla="*/ 2311817 w 2478157"/>
+              <a:gd name="connsiteY3" fmla="*/ 5332662 h 6858000"/>
+              <a:gd name="connsiteX4" fmla="*/ 435459 w 2478157"/>
+              <a:gd name="connsiteY4" fmla="*/ 3243362 h 6858000"/>
+              <a:gd name="connsiteX5" fmla="*/ 2417058 w 2478157"/>
+              <a:gd name="connsiteY5" fmla="*/ 1253600 h 6858000"/>
+              <a:gd name="connsiteX6" fmla="*/ 0 w 2478157"/>
+              <a:gd name="connsiteY6" fmla="*/ 0 h 6858000"/>
+              <a:gd name="connsiteX7" fmla="*/ 2478157 w 2478157"/>
+              <a:gd name="connsiteY7" fmla="*/ 0 h 6858000"/>
+              <a:gd name="connsiteX8" fmla="*/ 2478157 w 2478157"/>
+              <a:gd name="connsiteY8" fmla="*/ 1413910 h 6858000"/>
+              <a:gd name="connsiteX9" fmla="*/ 636105 w 2478157"/>
+              <a:gd name="connsiteY9" fmla="*/ 3255962 h 6858000"/>
+              <a:gd name="connsiteX10" fmla="*/ 2478157 w 2478157"/>
+              <a:gd name="connsiteY10" fmla="*/ 5098014 h 6858000"/>
+              <a:gd name="connsiteX11" fmla="*/ 2478157 w 2478157"/>
+              <a:gd name="connsiteY11" fmla="*/ 6858000 h 6858000"/>
+              <a:gd name="connsiteX12" fmla="*/ 0 w 2478157"/>
+              <a:gd name="connsiteY12" fmla="*/ 6858000 h 6858000"/>
+            </a:gdLst>
+            <a:ahLst/>
+            <a:cxnLst>
+              <a:cxn ang="0">
+                <a:pos x="connsiteX0" y="connsiteY0"/>
+              </a:cxn>
+              <a:cxn ang="0">
+                <a:pos x="connsiteX1" y="connsiteY1"/>
+              </a:cxn>
+              <a:cxn ang="0">
+                <a:pos x="connsiteX2" y="connsiteY2"/>
+              </a:cxn>
+              <a:cxn ang="0">
+                <a:pos x="connsiteX3" y="connsiteY3"/>
+              </a:cxn>
+              <a:cxn ang="0">
+                <a:pos x="connsiteX4" y="connsiteY4"/>
+              </a:cxn>
+              <a:cxn ang="0">
+                <a:pos x="connsiteX5" y="connsiteY5"/>
+              </a:cxn>
+              <a:cxn ang="0">
+                <a:pos x="connsiteX6" y="connsiteY6"/>
+              </a:cxn>
+              <a:cxn ang="0">
+                <a:pos x="connsiteX7" y="connsiteY7"/>
+              </a:cxn>
+              <a:cxn ang="0">
+                <a:pos x="connsiteX8" y="connsiteY8"/>
+              </a:cxn>
+              <a:cxn ang="0">
+                <a:pos x="connsiteX9" y="connsiteY9"/>
+              </a:cxn>
+              <a:cxn ang="0">
+                <a:pos x="connsiteX10" y="connsiteY10"/>
+              </a:cxn>
+              <a:cxn ang="0">
+                <a:pos x="connsiteX11" y="connsiteY11"/>
+              </a:cxn>
+              <a:cxn ang="0">
+                <a:pos x="connsiteX12" y="connsiteY12"/>
+              </a:cxn>
+            </a:cxnLst>
+            <a:rect l="l" t="t" r="r" b="b"/>
+            <a:pathLst>
+              <a:path w="2478157" h="6858000">
+                <a:moveTo>
+                  <a:pt x="2414919" y="1182062"/>
+                </a:moveTo>
+                <a:cubicBezTo>
+                  <a:pt x="1293111" y="1215621"/>
+                  <a:pt x="392859" y="2119581"/>
+                  <a:pt x="363913" y="3241518"/>
+                </a:cubicBezTo>
+                <a:cubicBezTo>
+                  <a:pt x="334966" y="4363454"/>
+                  <a:pt x="1187406" y="5312634"/>
+                  <a:pt x="2305991" y="5403995"/>
+                </a:cubicBezTo>
+                <a:lnTo>
+                  <a:pt x="2311817" y="5332662"/>
+                </a:lnTo>
+                <a:cubicBezTo>
+                  <a:pt x="1231085" y="5244392"/>
+                  <a:pt x="407492" y="4327332"/>
+                  <a:pt x="435459" y="3243362"/>
+                </a:cubicBezTo>
+                <a:cubicBezTo>
+                  <a:pt x="463426" y="2159392"/>
+                  <a:pt x="1333212" y="1286023"/>
+                  <a:pt x="2417058" y="1253600"/>
+                </a:cubicBezTo>
+                <a:close/>
+                <a:moveTo>
+                  <a:pt x="0" y="0"/>
+                </a:moveTo>
+                <a:lnTo>
+                  <a:pt x="2478157" y="0"/>
+                </a:lnTo>
+                <a:lnTo>
+                  <a:pt x="2478157" y="1413910"/>
+                </a:lnTo>
+                <a:cubicBezTo>
+                  <a:pt x="1460820" y="1413910"/>
+                  <a:pt x="636105" y="2238625"/>
+                  <a:pt x="636105" y="3255962"/>
+                </a:cubicBezTo>
+                <a:cubicBezTo>
+                  <a:pt x="636105" y="4273299"/>
+                  <a:pt x="1460820" y="5098014"/>
+                  <a:pt x="2478157" y="5098014"/>
+                </a:cubicBezTo>
+                <a:lnTo>
+                  <a:pt x="2478157" y="6858000"/>
+                </a:lnTo>
+                <a:lnTo>
+                  <a:pt x="0" y="6858000"/>
+                </a:lnTo>
+                <a:close/>
+              </a:path>
+            </a:pathLst>
+          </a:custGeom>
+        </p:spPr>
+        <p:style>
+          <a:lnRef idx="2">
+            <a:schemeClr val="accent1">
+              <a:shade val="50000"/>
+            </a:schemeClr>
+          </a:lnRef>
+          <a:fillRef idx="1">
+            <a:schemeClr val="accent1"/>
+          </a:fillRef>
+          <a:effectRef idx="0">
+            <a:schemeClr val="accent1"/>
+          </a:effectRef>
+          <a:fontRef idx="minor">
+            <a:schemeClr val="lt1"/>
+          </a:fontRef>
+        </p:style>
+        <p:txBody>
+          <a:bodyPr wrap="square" rtlCol="0" anchor="ctr">
+            <a:noAutofit/>
+          </a:bodyPr>
+          <a:lstStyle/>
+          <a:p>
+            <a:pPr algn="ctr"/>
+            <a:endParaRPr lang="en-US"/>
+          </a:p>
+        </p:txBody>
+      </p:sp>
+      <p:pic>
+        <p:nvPicPr>
+          <p:cNvPr id="9" name="Picture 8">
+            <a:extLst>
+              <a:ext uri="{FF2B5EF4-FFF2-40B4-BE49-F238E27FC236}">
+                <a16:creationId xmlns:a16="http://schemas.microsoft.com/office/drawing/2014/main" id="{5046105B-FCAE-4B27-8CD3-C9AE3156BEE0}"/>
+              </a:ext>
+            </a:extLst>
+          </p:cNvPr>
+          <p:cNvPicPr>
+            <a:picLocks noChangeAspect="1"/>
+          </p:cNvPicPr>
+          <p:nvPr/>
+        </p:nvPicPr>
+        <p:blipFill>
+          <a:blip r:embed="rId2"/>
+          <a:stretch>
+            <a:fillRect/>
+          </a:stretch>
+        </p:blipFill>
+        <p:spPr>
+          <a:xfrm>
+            <a:off x="891654" y="2074916"/>
+            <a:ext cx="2220036" cy="1996314"/>
+          </a:xfrm>
+          <a:prstGeom prst="rect">
+            <a:avLst/>
+          </a:prstGeom>
+        </p:spPr>
+      </p:pic>
+      <p:sp>
+        <p:nvSpPr>
+          <p:cNvPr id="10" name="TextBox 9">
+            <a:extLst>
+              <a:ext uri="{FF2B5EF4-FFF2-40B4-BE49-F238E27FC236}">
+                <a16:creationId xmlns:a16="http://schemas.microsoft.com/office/drawing/2014/main" id="{E4C39C0C-FD15-4FC8-9B30-02B9573965F1}"/>
+              </a:ext>
+            </a:extLst>
+          </p:cNvPr>
+          <p:cNvSpPr txBox="1"/>
+          <p:nvPr/>
+        </p:nvSpPr>
+        <p:spPr>
+          <a:xfrm>
+            <a:off x="1101797" y="4023286"/>
+            <a:ext cx="1822187" cy="461665"/>
+          </a:xfrm>
+          <a:prstGeom prst="rect">
+            <a:avLst/>
+          </a:prstGeom>
+          <a:noFill/>
+        </p:spPr>
+        <p:txBody>
+          <a:bodyPr wrap="square" rtlCol="0">
+            <a:spAutoFit/>
+          </a:bodyPr>
+          <a:lstStyle/>
+          <a:p>
+            <a:pPr algn="ctr"/>
+            <a:r>
+              <a:rPr lang="en-US" sz="2400">
+                <a:ln w="0"/>
+                <a:solidFill>
+                  <a:schemeClr val="accent1"/>
+                </a:solidFill>
+                <a:effectLst>
+                  <a:outerShdw blurRad="38100" dist="25400" dir="5400000" algn="ctr" rotWithShape="0">
+                    <a:srgbClr val="6E747A">
+                      <a:alpha val="43000"/>
+                    </a:srgbClr>
+                  </a:outerShdw>
+                </a:effectLst>
+              </a:rPr>
+              <a:t>Spring Boot</a:t>
+            </a:r>
+          </a:p>
+        </p:txBody>
+      </p:sp>
+      <p:grpSp>
+        <p:nvGrpSpPr>
+          <p:cNvPr id="26" name="Group 25">
+            <a:extLst>
+              <a:ext uri="{FF2B5EF4-FFF2-40B4-BE49-F238E27FC236}">
+                <a16:creationId xmlns:a16="http://schemas.microsoft.com/office/drawing/2014/main" id="{C0AA48B8-B05B-4D93-8F10-B2F4EC39FED4}"/>
+              </a:ext>
+            </a:extLst>
+          </p:cNvPr>
+          <p:cNvGrpSpPr/>
+          <p:nvPr/>
+        </p:nvGrpSpPr>
+        <p:grpSpPr>
+          <a:xfrm>
+            <a:off x="11420105" y="10013"/>
+            <a:ext cx="864660" cy="6858000"/>
+            <a:chOff x="11418977" y="1579875"/>
+            <a:chExt cx="681387" cy="4661270"/>
+          </a:xfrm>
+        </p:grpSpPr>
+        <p:sp>
+          <p:nvSpPr>
+            <p:cNvPr id="13" name="Rectangle 12">
+              <a:extLst>
+                <a:ext uri="{FF2B5EF4-FFF2-40B4-BE49-F238E27FC236}">
+                  <a16:creationId xmlns:a16="http://schemas.microsoft.com/office/drawing/2014/main" id="{DCB2CE49-C4CC-421A-BACE-BB59401D7156}"/>
+                </a:ext>
+              </a:extLst>
+            </p:cNvPr>
+            <p:cNvSpPr/>
+            <p:nvPr/>
+          </p:nvSpPr>
+          <p:spPr>
+            <a:xfrm>
+              <a:off x="11604306" y="1579875"/>
+              <a:ext cx="391383" cy="4661270"/>
+            </a:xfrm>
+            <a:prstGeom prst="rect">
+              <a:avLst/>
+            </a:prstGeom>
+            <a:solidFill>
+              <a:schemeClr val="accent4">
+                <a:lumMod val="50000"/>
+              </a:schemeClr>
+            </a:solidFill>
+            <a:ln>
+              <a:solidFill>
+                <a:schemeClr val="accent5"/>
+              </a:solidFill>
+            </a:ln>
+          </p:spPr>
+          <p:style>
+            <a:lnRef idx="2">
+              <a:schemeClr val="accent1">
+                <a:shade val="50000"/>
+              </a:schemeClr>
+            </a:lnRef>
+            <a:fillRef idx="1">
+              <a:schemeClr val="accent1"/>
+            </a:fillRef>
+            <a:effectRef idx="0">
+              <a:schemeClr val="accent1"/>
+            </a:effectRef>
+            <a:fontRef idx="minor">
+              <a:schemeClr val="lt1"/>
+            </a:fontRef>
+          </p:style>
+          <p:txBody>
+            <a:bodyPr rtlCol="0" anchor="ctr"/>
+            <a:lstStyle/>
+            <a:p>
+              <a:pPr algn="ctr"/>
+              <a:endParaRPr lang="en-US"/>
+            </a:p>
+          </p:txBody>
+        </p:sp>
+        <p:sp>
+          <p:nvSpPr>
+            <p:cNvPr id="14" name="Oval 13">
+              <a:extLst>
+                <a:ext uri="{FF2B5EF4-FFF2-40B4-BE49-F238E27FC236}">
+                  <a16:creationId xmlns:a16="http://schemas.microsoft.com/office/drawing/2014/main" id="{FE26A2D4-C479-4A37-B431-E54BC32EF19B}"/>
+                </a:ext>
+              </a:extLst>
+            </p:cNvPr>
+            <p:cNvSpPr/>
+            <p:nvPr/>
+          </p:nvSpPr>
+          <p:spPr>
+            <a:xfrm rot="19906743" flipV="1">
+              <a:off x="11418977" y="1968062"/>
+              <a:ext cx="681387" cy="111006"/>
+            </a:xfrm>
+            <a:prstGeom prst="ellipse">
+              <a:avLst/>
+            </a:prstGeom>
+          </p:spPr>
+          <p:style>
+            <a:lnRef idx="2">
+              <a:schemeClr val="accent1">
+                <a:shade val="50000"/>
+              </a:schemeClr>
+            </a:lnRef>
+            <a:fillRef idx="1">
+              <a:schemeClr val="accent1"/>
+            </a:fillRef>
+            <a:effectRef idx="0">
+              <a:schemeClr val="accent1"/>
+            </a:effectRef>
+            <a:fontRef idx="minor">
+              <a:schemeClr val="lt1"/>
+            </a:fontRef>
+          </p:style>
+          <p:txBody>
+            <a:bodyPr rtlCol="0" anchor="ctr"/>
+            <a:lstStyle/>
+            <a:p>
+              <a:pPr algn="ctr"/>
+              <a:endParaRPr lang="en-US"/>
+            </a:p>
+          </p:txBody>
+        </p:sp>
+        <p:sp>
+          <p:nvSpPr>
+            <p:cNvPr id="15" name="Oval 14">
+              <a:extLst>
+                <a:ext uri="{FF2B5EF4-FFF2-40B4-BE49-F238E27FC236}">
+                  <a16:creationId xmlns:a16="http://schemas.microsoft.com/office/drawing/2014/main" id="{96E2DE78-A774-4053-B979-A6475BF85A84}"/>
+                </a:ext>
+              </a:extLst>
+            </p:cNvPr>
+            <p:cNvSpPr/>
+            <p:nvPr/>
+          </p:nvSpPr>
+          <p:spPr>
+            <a:xfrm rot="19906743" flipV="1">
+              <a:off x="11418977" y="2321137"/>
+              <a:ext cx="681387" cy="111006"/>
+            </a:xfrm>
+            <a:prstGeom prst="ellipse">
+              <a:avLst/>
+            </a:prstGeom>
+          </p:spPr>
+          <p:style>
+            <a:lnRef idx="2">
+              <a:schemeClr val="accent1">
+                <a:shade val="50000"/>
+              </a:schemeClr>
+            </a:lnRef>
+            <a:fillRef idx="1">
+              <a:schemeClr val="accent1"/>
+            </a:fillRef>
+            <a:effectRef idx="0">
+              <a:schemeClr val="accent1"/>
+            </a:effectRef>
+            <a:fontRef idx="minor">
+              <a:schemeClr val="lt1"/>
+            </a:fontRef>
+          </p:style>
+          <p:txBody>
+            <a:bodyPr rtlCol="0" anchor="ctr"/>
+            <a:lstStyle/>
+            <a:p>
+              <a:pPr algn="ctr"/>
+              <a:endParaRPr lang="en-US"/>
+            </a:p>
+          </p:txBody>
+        </p:sp>
+        <p:sp>
+          <p:nvSpPr>
+            <p:cNvPr id="16" name="Oval 15">
+              <a:extLst>
+                <a:ext uri="{FF2B5EF4-FFF2-40B4-BE49-F238E27FC236}">
+                  <a16:creationId xmlns:a16="http://schemas.microsoft.com/office/drawing/2014/main" id="{A3DF1379-DC92-4D06-B06B-7D1178C5BCC8}"/>
+                </a:ext>
+              </a:extLst>
+            </p:cNvPr>
+            <p:cNvSpPr/>
+            <p:nvPr/>
+          </p:nvSpPr>
+          <p:spPr>
+            <a:xfrm rot="19906743" flipV="1">
+              <a:off x="11418977" y="2674211"/>
+              <a:ext cx="681387" cy="111006"/>
+            </a:xfrm>
+            <a:prstGeom prst="ellipse">
+              <a:avLst/>
+            </a:prstGeom>
+          </p:spPr>
+          <p:style>
+            <a:lnRef idx="2">
+              <a:schemeClr val="accent1">
+                <a:shade val="50000"/>
+              </a:schemeClr>
+            </a:lnRef>
+            <a:fillRef idx="1">
+              <a:schemeClr val="accent1"/>
+            </a:fillRef>
+            <a:effectRef idx="0">
+              <a:schemeClr val="accent1"/>
+            </a:effectRef>
+            <a:fontRef idx="minor">
+              <a:schemeClr val="lt1"/>
+            </a:fontRef>
+          </p:style>
+          <p:txBody>
+            <a:bodyPr rtlCol="0" anchor="ctr"/>
+            <a:lstStyle/>
+            <a:p>
+              <a:pPr algn="ctr"/>
+              <a:endParaRPr lang="en-US"/>
+            </a:p>
+          </p:txBody>
+        </p:sp>
+        <p:sp>
+          <p:nvSpPr>
+            <p:cNvPr id="17" name="Oval 16">
+              <a:extLst>
+                <a:ext uri="{FF2B5EF4-FFF2-40B4-BE49-F238E27FC236}">
+                  <a16:creationId xmlns:a16="http://schemas.microsoft.com/office/drawing/2014/main" id="{EF2E6FB5-415B-4811-A272-E79C7649FC41}"/>
+                </a:ext>
+              </a:extLst>
+            </p:cNvPr>
+            <p:cNvSpPr/>
+            <p:nvPr/>
+          </p:nvSpPr>
+          <p:spPr>
+            <a:xfrm rot="19906743" flipV="1">
+              <a:off x="11418977" y="3027286"/>
+              <a:ext cx="681387" cy="111006"/>
+            </a:xfrm>
+            <a:prstGeom prst="ellipse">
+              <a:avLst/>
+            </a:prstGeom>
+          </p:spPr>
+          <p:style>
+            <a:lnRef idx="2">
+              <a:schemeClr val="accent1">
+                <a:shade val="50000"/>
+              </a:schemeClr>
+            </a:lnRef>
+            <a:fillRef idx="1">
+              <a:schemeClr val="accent1"/>
+            </a:fillRef>
+            <a:effectRef idx="0">
+              <a:schemeClr val="accent1"/>
+            </a:effectRef>
+            <a:fontRef idx="minor">
+              <a:schemeClr val="lt1"/>
+            </a:fontRef>
+          </p:style>
+          <p:txBody>
+            <a:bodyPr rtlCol="0" anchor="ctr"/>
+            <a:lstStyle/>
+            <a:p>
+              <a:pPr algn="ctr"/>
+              <a:endParaRPr lang="en-US"/>
+            </a:p>
+          </p:txBody>
+        </p:sp>
+        <p:sp>
+          <p:nvSpPr>
+            <p:cNvPr id="18" name="Oval 17">
+              <a:extLst>
+                <a:ext uri="{FF2B5EF4-FFF2-40B4-BE49-F238E27FC236}">
+                  <a16:creationId xmlns:a16="http://schemas.microsoft.com/office/drawing/2014/main" id="{9BF1D878-42D1-4A3B-B722-3EB2CB6E27BA}"/>
+                </a:ext>
+              </a:extLst>
+            </p:cNvPr>
+            <p:cNvSpPr/>
+            <p:nvPr/>
+          </p:nvSpPr>
+          <p:spPr>
+            <a:xfrm rot="19906743" flipV="1">
+              <a:off x="11418977" y="3380360"/>
+              <a:ext cx="681387" cy="111006"/>
+            </a:xfrm>
+            <a:prstGeom prst="ellipse">
+              <a:avLst/>
+            </a:prstGeom>
+          </p:spPr>
+          <p:style>
+            <a:lnRef idx="2">
+              <a:schemeClr val="accent1">
+                <a:shade val="50000"/>
+              </a:schemeClr>
+            </a:lnRef>
+            <a:fillRef idx="1">
+              <a:schemeClr val="accent1"/>
+            </a:fillRef>
+            <a:effectRef idx="0">
+              <a:schemeClr val="accent1"/>
+            </a:effectRef>
+            <a:fontRef idx="minor">
+              <a:schemeClr val="lt1"/>
+            </a:fontRef>
+          </p:style>
+          <p:txBody>
+            <a:bodyPr rtlCol="0" anchor="ctr"/>
+            <a:lstStyle/>
+            <a:p>
+              <a:pPr algn="ctr"/>
+              <a:endParaRPr lang="en-US"/>
+            </a:p>
+          </p:txBody>
+        </p:sp>
+        <p:sp>
+          <p:nvSpPr>
+            <p:cNvPr id="19" name="Oval 18">
+              <a:extLst>
+                <a:ext uri="{FF2B5EF4-FFF2-40B4-BE49-F238E27FC236}">
+                  <a16:creationId xmlns:a16="http://schemas.microsoft.com/office/drawing/2014/main" id="{B34E6821-D1E2-44D0-8D05-1A326399F4C6}"/>
+                </a:ext>
+              </a:extLst>
+            </p:cNvPr>
+            <p:cNvSpPr/>
+            <p:nvPr/>
+          </p:nvSpPr>
+          <p:spPr>
+            <a:xfrm rot="19906743" flipV="1">
+              <a:off x="11418977" y="3733435"/>
+              <a:ext cx="681387" cy="111006"/>
+            </a:xfrm>
+            <a:prstGeom prst="ellipse">
+              <a:avLst/>
+            </a:prstGeom>
+          </p:spPr>
+          <p:style>
+            <a:lnRef idx="2">
+              <a:schemeClr val="accent1">
+                <a:shade val="50000"/>
+              </a:schemeClr>
+            </a:lnRef>
+            <a:fillRef idx="1">
+              <a:schemeClr val="accent1"/>
+            </a:fillRef>
+            <a:effectRef idx="0">
+              <a:schemeClr val="accent1"/>
+            </a:effectRef>
+            <a:fontRef idx="minor">
+              <a:schemeClr val="lt1"/>
+            </a:fontRef>
+          </p:style>
+          <p:txBody>
+            <a:bodyPr rtlCol="0" anchor="ctr"/>
+            <a:lstStyle/>
+            <a:p>
+              <a:pPr algn="ctr"/>
+              <a:endParaRPr lang="en-US"/>
+            </a:p>
+          </p:txBody>
+        </p:sp>
+        <p:sp>
+          <p:nvSpPr>
+            <p:cNvPr id="20" name="Oval 19">
+              <a:extLst>
+                <a:ext uri="{FF2B5EF4-FFF2-40B4-BE49-F238E27FC236}">
+                  <a16:creationId xmlns:a16="http://schemas.microsoft.com/office/drawing/2014/main" id="{9D8BB4E8-A8AD-4D3F-B19B-0F30DD69CC35}"/>
+                </a:ext>
+              </a:extLst>
+            </p:cNvPr>
+            <p:cNvSpPr/>
+            <p:nvPr/>
+          </p:nvSpPr>
+          <p:spPr>
+            <a:xfrm rot="19906743" flipV="1">
+              <a:off x="11418977" y="4086509"/>
+              <a:ext cx="681387" cy="111006"/>
+            </a:xfrm>
+            <a:prstGeom prst="ellipse">
+              <a:avLst/>
+            </a:prstGeom>
+          </p:spPr>
+          <p:style>
+            <a:lnRef idx="2">
+              <a:schemeClr val="accent1">
+                <a:shade val="50000"/>
+              </a:schemeClr>
+            </a:lnRef>
+            <a:fillRef idx="1">
+              <a:schemeClr val="accent1"/>
+            </a:fillRef>
+            <a:effectRef idx="0">
+              <a:schemeClr val="accent1"/>
+            </a:effectRef>
+            <a:fontRef idx="minor">
+              <a:schemeClr val="lt1"/>
+            </a:fontRef>
+          </p:style>
+          <p:txBody>
+            <a:bodyPr rtlCol="0" anchor="ctr"/>
+            <a:lstStyle/>
+            <a:p>
+              <a:pPr algn="ctr"/>
+              <a:endParaRPr lang="en-US"/>
+            </a:p>
+          </p:txBody>
+        </p:sp>
+        <p:sp>
+          <p:nvSpPr>
+            <p:cNvPr id="21" name="Oval 20">
+              <a:extLst>
+                <a:ext uri="{FF2B5EF4-FFF2-40B4-BE49-F238E27FC236}">
+                  <a16:creationId xmlns:a16="http://schemas.microsoft.com/office/drawing/2014/main" id="{5522C316-C470-467E-AF93-0D1140C90CA1}"/>
+                </a:ext>
+              </a:extLst>
+            </p:cNvPr>
+            <p:cNvSpPr/>
+            <p:nvPr/>
+          </p:nvSpPr>
+          <p:spPr>
+            <a:xfrm rot="19906743" flipV="1">
+              <a:off x="11418977" y="4439584"/>
+              <a:ext cx="681387" cy="111006"/>
+            </a:xfrm>
+            <a:prstGeom prst="ellipse">
+              <a:avLst/>
+            </a:prstGeom>
+          </p:spPr>
+          <p:style>
+            <a:lnRef idx="2">
+              <a:schemeClr val="accent1">
+                <a:shade val="50000"/>
+              </a:schemeClr>
+            </a:lnRef>
+            <a:fillRef idx="1">
+              <a:schemeClr val="accent1"/>
+            </a:fillRef>
+            <a:effectRef idx="0">
+              <a:schemeClr val="accent1"/>
+            </a:effectRef>
+            <a:fontRef idx="minor">
+              <a:schemeClr val="lt1"/>
+            </a:fontRef>
+          </p:style>
+          <p:txBody>
+            <a:bodyPr rtlCol="0" anchor="ctr"/>
+            <a:lstStyle/>
+            <a:p>
+              <a:pPr algn="ctr"/>
+              <a:endParaRPr lang="en-US"/>
+            </a:p>
+          </p:txBody>
+        </p:sp>
+        <p:sp>
+          <p:nvSpPr>
+            <p:cNvPr id="22" name="Oval 21">
+              <a:extLst>
+                <a:ext uri="{FF2B5EF4-FFF2-40B4-BE49-F238E27FC236}">
+                  <a16:creationId xmlns:a16="http://schemas.microsoft.com/office/drawing/2014/main" id="{8F38B5FC-9761-42CA-AE85-236FC2632969}"/>
+                </a:ext>
+              </a:extLst>
+            </p:cNvPr>
+            <p:cNvSpPr/>
+            <p:nvPr/>
+          </p:nvSpPr>
+          <p:spPr>
+            <a:xfrm rot="19906743" flipV="1">
+              <a:off x="11418977" y="4792658"/>
+              <a:ext cx="681387" cy="111006"/>
+            </a:xfrm>
+            <a:prstGeom prst="ellipse">
+              <a:avLst/>
+            </a:prstGeom>
+          </p:spPr>
+          <p:style>
+            <a:lnRef idx="2">
+              <a:schemeClr val="accent1">
+                <a:shade val="50000"/>
+              </a:schemeClr>
+            </a:lnRef>
+            <a:fillRef idx="1">
+              <a:schemeClr val="accent1"/>
+            </a:fillRef>
+            <a:effectRef idx="0">
+              <a:schemeClr val="accent1"/>
+            </a:effectRef>
+            <a:fontRef idx="minor">
+              <a:schemeClr val="lt1"/>
+            </a:fontRef>
+          </p:style>
+          <p:txBody>
+            <a:bodyPr rtlCol="0" anchor="ctr"/>
+            <a:lstStyle/>
+            <a:p>
+              <a:pPr algn="ctr"/>
+              <a:endParaRPr lang="en-US"/>
+            </a:p>
+          </p:txBody>
+        </p:sp>
+        <p:sp>
+          <p:nvSpPr>
+            <p:cNvPr id="23" name="Oval 22">
+              <a:extLst>
+                <a:ext uri="{FF2B5EF4-FFF2-40B4-BE49-F238E27FC236}">
+                  <a16:creationId xmlns:a16="http://schemas.microsoft.com/office/drawing/2014/main" id="{7C5813BF-DBFF-4B1F-A88A-D05CEE50C831}"/>
+                </a:ext>
+              </a:extLst>
+            </p:cNvPr>
+            <p:cNvSpPr/>
+            <p:nvPr/>
+          </p:nvSpPr>
+          <p:spPr>
+            <a:xfrm rot="19906743" flipV="1">
+              <a:off x="11418977" y="5145733"/>
+              <a:ext cx="681387" cy="111006"/>
+            </a:xfrm>
+            <a:prstGeom prst="ellipse">
+              <a:avLst/>
+            </a:prstGeom>
+          </p:spPr>
+          <p:style>
+            <a:lnRef idx="2">
+              <a:schemeClr val="accent1">
+                <a:shade val="50000"/>
+              </a:schemeClr>
+            </a:lnRef>
+            <a:fillRef idx="1">
+              <a:schemeClr val="accent1"/>
+            </a:fillRef>
+            <a:effectRef idx="0">
+              <a:schemeClr val="accent1"/>
+            </a:effectRef>
+            <a:fontRef idx="minor">
+              <a:schemeClr val="lt1"/>
+            </a:fontRef>
+          </p:style>
+          <p:txBody>
+            <a:bodyPr rtlCol="0" anchor="ctr"/>
+            <a:lstStyle/>
+            <a:p>
+              <a:pPr algn="ctr"/>
+              <a:endParaRPr lang="en-US"/>
+            </a:p>
+          </p:txBody>
+        </p:sp>
+        <p:sp>
+          <p:nvSpPr>
+            <p:cNvPr id="24" name="Oval 23">
+              <a:extLst>
+                <a:ext uri="{FF2B5EF4-FFF2-40B4-BE49-F238E27FC236}">
+                  <a16:creationId xmlns:a16="http://schemas.microsoft.com/office/drawing/2014/main" id="{F2D92BD1-1D61-4BA2-B617-E0453B778E20}"/>
+                </a:ext>
+              </a:extLst>
+            </p:cNvPr>
+            <p:cNvSpPr/>
+            <p:nvPr/>
+          </p:nvSpPr>
+          <p:spPr>
+            <a:xfrm rot="19906743" flipV="1">
+              <a:off x="11418977" y="5498807"/>
+              <a:ext cx="681387" cy="111006"/>
+            </a:xfrm>
+            <a:prstGeom prst="ellipse">
+              <a:avLst/>
+            </a:prstGeom>
+          </p:spPr>
+          <p:style>
+            <a:lnRef idx="2">
+              <a:schemeClr val="accent1">
+                <a:shade val="50000"/>
+              </a:schemeClr>
+            </a:lnRef>
+            <a:fillRef idx="1">
+              <a:schemeClr val="accent1"/>
+            </a:fillRef>
+            <a:effectRef idx="0">
+              <a:schemeClr val="accent1"/>
+            </a:effectRef>
+            <a:fontRef idx="minor">
+              <a:schemeClr val="lt1"/>
+            </a:fontRef>
+          </p:style>
+          <p:txBody>
+            <a:bodyPr rtlCol="0" anchor="ctr"/>
+            <a:lstStyle/>
+            <a:p>
+              <a:pPr algn="ctr"/>
+              <a:endParaRPr lang="en-US"/>
+            </a:p>
+          </p:txBody>
+        </p:sp>
+        <p:sp>
+          <p:nvSpPr>
+            <p:cNvPr id="25" name="Oval 24">
+              <a:extLst>
+                <a:ext uri="{FF2B5EF4-FFF2-40B4-BE49-F238E27FC236}">
+                  <a16:creationId xmlns:a16="http://schemas.microsoft.com/office/drawing/2014/main" id="{D071AE62-2D85-446E-902D-B149C5FECF5B}"/>
+                </a:ext>
+              </a:extLst>
+            </p:cNvPr>
+            <p:cNvSpPr/>
+            <p:nvPr/>
+          </p:nvSpPr>
+          <p:spPr>
+            <a:xfrm rot="19906743" flipV="1">
+              <a:off x="11418977" y="5851882"/>
+              <a:ext cx="681387" cy="111006"/>
+            </a:xfrm>
+            <a:prstGeom prst="ellipse">
+              <a:avLst/>
+            </a:prstGeom>
+          </p:spPr>
+          <p:style>
+            <a:lnRef idx="2">
+              <a:schemeClr val="accent1">
+                <a:shade val="50000"/>
+              </a:schemeClr>
+            </a:lnRef>
+            <a:fillRef idx="1">
+              <a:schemeClr val="accent1"/>
+            </a:fillRef>
+            <a:effectRef idx="0">
+              <a:schemeClr val="accent1"/>
+            </a:effectRef>
+            <a:fontRef idx="minor">
+              <a:schemeClr val="lt1"/>
+            </a:fontRef>
+          </p:style>
+          <p:txBody>
+            <a:bodyPr rtlCol="0" anchor="ctr"/>
+            <a:lstStyle/>
+            <a:p>
+              <a:pPr algn="ctr"/>
+              <a:endParaRPr lang="en-US"/>
+            </a:p>
+          </p:txBody>
+        </p:sp>
+      </p:grpSp>
+      <p:sp>
+        <p:nvSpPr>
+          <p:cNvPr id="34" name="Diagonal Stripe 33">
+            <a:extLst>
+              <a:ext uri="{FF2B5EF4-FFF2-40B4-BE49-F238E27FC236}">
+                <a16:creationId xmlns:a16="http://schemas.microsoft.com/office/drawing/2014/main" id="{DBC811D1-03C8-4F51-A0B5-174F7F2B4A8C}"/>
+              </a:ext>
+            </a:extLst>
+          </p:cNvPr>
+          <p:cNvSpPr/>
+          <p:nvPr/>
+        </p:nvSpPr>
+        <p:spPr>
+          <a:xfrm rot="3043583">
+            <a:off x="4219405" y="3400131"/>
+            <a:ext cx="5650450" cy="6888587"/>
+          </a:xfrm>
+          <a:prstGeom prst="diagStripe">
+            <a:avLst>
+              <a:gd name="adj" fmla="val 89973"/>
+            </a:avLst>
+          </a:prstGeom>
+          <a:solidFill>
+            <a:srgbClr val="A1D68E"/>
+          </a:solidFill>
+        </p:spPr>
+        <p:style>
+          <a:lnRef idx="2">
+            <a:schemeClr val="accent1">
+              <a:shade val="50000"/>
+            </a:schemeClr>
+          </a:lnRef>
+          <a:fillRef idx="1">
+            <a:schemeClr val="accent1"/>
+          </a:fillRef>
+          <a:effectRef idx="0">
+            <a:schemeClr val="accent1"/>
+          </a:effectRef>
+          <a:fontRef idx="minor">
+            <a:schemeClr val="lt1"/>
+          </a:fontRef>
+        </p:style>
+        <p:txBody>
+          <a:bodyPr rtlCol="0" anchor="ctr"/>
+          <a:lstStyle/>
+          <a:p>
+            <a:pPr algn="ctr"/>
+            <a:endParaRPr lang="en-US">
+              <a:solidFill>
+                <a:schemeClr val="tx1"/>
+              </a:solidFill>
+            </a:endParaRPr>
+          </a:p>
+        </p:txBody>
+      </p:sp>
+      <p:sp>
+        <p:nvSpPr>
+          <p:cNvPr id="38" name="Diagonal Stripe 37">
+            <a:extLst>
+              <a:ext uri="{FF2B5EF4-FFF2-40B4-BE49-F238E27FC236}">
+                <a16:creationId xmlns:a16="http://schemas.microsoft.com/office/drawing/2014/main" id="{2D50C728-F09F-4825-AF05-5101E40A5B36}"/>
+              </a:ext>
+            </a:extLst>
+          </p:cNvPr>
+          <p:cNvSpPr/>
+          <p:nvPr/>
+        </p:nvSpPr>
+        <p:spPr>
+          <a:xfrm rot="18561219" flipV="1">
+            <a:off x="4152876" y="-3460625"/>
+            <a:ext cx="5650450" cy="6888587"/>
+          </a:xfrm>
+          <a:prstGeom prst="diagStripe">
+            <a:avLst>
+              <a:gd name="adj" fmla="val 83495"/>
+            </a:avLst>
+          </a:prstGeom>
+          <a:solidFill>
+            <a:srgbClr val="A1D68E"/>
+          </a:solidFill>
+        </p:spPr>
+        <p:style>
+          <a:lnRef idx="2">
+            <a:schemeClr val="accent1">
+              <a:shade val="50000"/>
+            </a:schemeClr>
+          </a:lnRef>
+          <a:fillRef idx="1">
+            <a:schemeClr val="accent1"/>
+          </a:fillRef>
+          <a:effectRef idx="0">
+            <a:schemeClr val="accent1"/>
+          </a:effectRef>
+          <a:fontRef idx="minor">
+            <a:schemeClr val="lt1"/>
+          </a:fontRef>
+        </p:style>
+        <p:txBody>
+          <a:bodyPr rtlCol="0" anchor="ctr"/>
+          <a:lstStyle/>
+          <a:p>
+            <a:pPr algn="ctr"/>
+            <a:endParaRPr lang="en-US">
+              <a:solidFill>
+                <a:schemeClr val="tx1"/>
+              </a:solidFill>
+            </a:endParaRPr>
+          </a:p>
+        </p:txBody>
+      </p:sp>
+    </p:spTree>
+    <p:extLst>
+      <p:ext uri="{BB962C8B-B14F-4D97-AF65-F5344CB8AC3E}">
+        <p14:creationId xmlns:p14="http://schemas.microsoft.com/office/powerpoint/2010/main" val="1005524386"/>
       </p:ext>
     </p:extLst>
   </p:cSld>

</xml_diff>